<commit_message>
preparting slides for mozilla intern presentation
</commit_message>
<xml_diff>
--- a/mozilla-intern-presentation.pptx
+++ b/mozilla-intern-presentation.pptx
@@ -2,22 +2,22 @@
 <file path=ppt/presentation.xml><?xml version="1.0" encoding="utf-8"?>
 <p:presentation xmlns:a="http://schemas.openxmlformats.org/drawingml/2006/main" xmlns:r="http://schemas.openxmlformats.org/officeDocument/2006/relationships" xmlns:mc="http://schemas.openxmlformats.org/markup-compatibility/2006" xmlns:mv="urn:schemas-microsoft-com:mac:vml" xmlns:p="http://schemas.openxmlformats.org/presentationml/2006/main" xmlns:c="http://schemas.openxmlformats.org/drawingml/2006/chart" xmlns:dgm="http://schemas.openxmlformats.org/drawingml/2006/diagram" xmlns:o="urn:schemas-microsoft-com:office:office" xmlns:v="urn:schemas-microsoft-com:vml" xmlns:pvml="urn:schemas-microsoft-com:office:powerpoint" xmlns:com="http://schemas.openxmlformats.org/drawingml/2006/compatibility" xmlns:p14="http://schemas.microsoft.com/office/powerpoint/2010/main" xmlns:p15="http://schemas.microsoft.com/office/powerpoint/2012/main" autoCompressPictures="0" strictFirstAndLastChars="0" saveSubsetFonts="1">
   <p:sldMasterIdLst>
-    <p:sldMasterId id="2147483659" r:id="rId3"/>
+    <p:sldMasterId id="2147483659" r:id="rId4"/>
   </p:sldMasterIdLst>
   <p:notesMasterIdLst>
-    <p:notesMasterId r:id="rId4"/>
+    <p:notesMasterId r:id="rId5"/>
   </p:notesMasterIdLst>
   <p:sldIdLst>
-    <p:sldId id="256" r:id="rId5"/>
-    <p:sldId id="257" r:id="rId6"/>
-    <p:sldId id="258" r:id="rId7"/>
-    <p:sldId id="259" r:id="rId8"/>
-    <p:sldId id="260" r:id="rId9"/>
-    <p:sldId id="261" r:id="rId10"/>
-    <p:sldId id="262" r:id="rId11"/>
-    <p:sldId id="263" r:id="rId12"/>
-    <p:sldId id="264" r:id="rId13"/>
-    <p:sldId id="265" r:id="rId14"/>
+    <p:sldId id="256" r:id="rId6"/>
+    <p:sldId id="257" r:id="rId7"/>
+    <p:sldId id="258" r:id="rId8"/>
+    <p:sldId id="259" r:id="rId9"/>
+    <p:sldId id="260" r:id="rId10"/>
+    <p:sldId id="261" r:id="rId11"/>
+    <p:sldId id="262" r:id="rId12"/>
+    <p:sldId id="263" r:id="rId13"/>
+    <p:sldId id="264" r:id="rId14"/>
+    <p:sldId id="265" r:id="rId15"/>
   </p:sldIdLst>
   <p:sldSz cy="5143500" cx="9144000"/>
   <p:notesSz cx="6858000" cy="9144000"/>
@@ -224,6 +224,35 @@
     </a:lvl9pPr>
   </p:defaultTextStyle>
 </p:presentation>
+</file>
+
+<file path=ppt/commentAuthors.xml><?xml version="1.0" encoding="utf-8"?>
+<p:cmAuthorLst xmlns:a="http://schemas.openxmlformats.org/drawingml/2006/main" xmlns:r="http://schemas.openxmlformats.org/officeDocument/2006/relationships" xmlns:mc="http://schemas.openxmlformats.org/markup-compatibility/2006" xmlns:mv="urn:schemas-microsoft-com:mac:vml" xmlns:p="http://schemas.openxmlformats.org/presentationml/2006/main" xmlns:c="http://schemas.openxmlformats.org/drawingml/2006/chart" xmlns:dgm="http://schemas.openxmlformats.org/drawingml/2006/diagram" xmlns:o="urn:schemas-microsoft-com:office:office" xmlns:v="urn:schemas-microsoft-com:vml" xmlns:pvml="urn:schemas-microsoft-com:office:powerpoint" xmlns:com="http://schemas.openxmlformats.org/drawingml/2006/compatibility" xmlns:p14="http://schemas.microsoft.com/office/powerpoint/2010/main" xmlns:p15="http://schemas.microsoft.com/office/powerpoint/2012/main">
+  <p:cmAuthor clrIdx="0" id="0" initials="" lastIdx="2" name="Eric Rescorla"/>
+  <p:cmAuthor clrIdx="1" id="1" initials="" lastIdx="2" name="Sajjad Arshad"/>
+</p:cmAuthorLst>
+</file>
+
+<file path=ppt/comments/comment1.xml><?xml version="1.0" encoding="utf-8"?>
+<p:cmLst xmlns:a="http://schemas.openxmlformats.org/drawingml/2006/main" xmlns:r="http://schemas.openxmlformats.org/officeDocument/2006/relationships" xmlns:mc="http://schemas.openxmlformats.org/markup-compatibility/2006" xmlns:mv="urn:schemas-microsoft-com:mac:vml" xmlns:p="http://schemas.openxmlformats.org/presentationml/2006/main" xmlns:c="http://schemas.openxmlformats.org/drawingml/2006/chart" xmlns:dgm="http://schemas.openxmlformats.org/drawingml/2006/diagram" xmlns:o="urn:schemas-microsoft-com:office:office" xmlns:v="urn:schemas-microsoft-com:vml" xmlns:pvml="urn:schemas-microsoft-com:office:powerpoint" xmlns:com="http://schemas.openxmlformats.org/drawingml/2006/compatibility" xmlns:p14="http://schemas.microsoft.com/office/powerpoint/2010/main" xmlns:p15="http://schemas.microsoft.com/office/powerpoint/2012/main">
+  <p:cm authorId="0" idx="1" dt="2017-08-11T04:01:32.522">
+    <p:pos x="6000" y="0"/>
+    <p:text>This seems like it needs more explanation, because there's a base rate of 1.3 works and 1.2 doesn't too of ~1% right?</p:text>
+  </p:cm>
+  <p:cm authorId="1" idx="1" dt="2017-08-11T03:22:35.705">
+    <p:pos x="6000" y="100"/>
+    <p:text>I am not sure what you mean, but basically these are the clients that had successful connection to control and disabled.tls13.com servers, but they had problem connecting to enabled.tls13.com server. Anyhow, I will explain in more detail during the presentation. I just didn't want to dump too many stuff in the slide.</p:text>
+  </p:cm>
+  <p:cm authorId="0" idx="2" dt="2017-08-11T03:42:06.174">
+    <p:pos x="6000" y="200"/>
+    <p:text>What I mean is that there are *also(* clients which could connect to enabled.tls13.com but *not* to disabled.tls13.com, so 2.5% isnt necessarily an accurate estimate of excess failures.</p:text>
+  </p:cm>
+  <p:cm authorId="1" idx="2" dt="2017-08-11T04:01:32.522">
+    <p:pos x="6000" y="300"/>
+    <p:text>I see So, what do you suggest we add here to cover this case as well?
+Basically, this is not something we are interested in, are we? This might have happened due to random stuff going on in the network. That's why we are now running the experiment multiple times to make sure the failure happens in all the attempts.</p:text>
+  </p:cm>
+</p:cmLst>
 </file>
 
 <file path=ppt/notesMasters/notesMaster1.xml><?xml version="1.0" encoding="utf-8"?>
@@ -5178,7 +5207,7 @@
                   <a:srgbClr val="FF0000"/>
                 </a:solidFill>
               </a:rPr>
-              <a:t>But it was disabled due to incompatible middleboxes such as Blue Coat web proxy</a:t>
+              <a:t>But it was disabled due to incompatible middleboxes</a:t>
             </a:r>
           </a:p>
         </p:txBody>
@@ -5281,7 +5310,35 @@
             </a:r>
             <a:r>
               <a:rPr lang="en"/>
-              <a:t>iddleboxes (e.g., Firewalls, Antiviruses, Web Proxies) intercept HTTPS connections to inspect the content</a:t>
+              <a:t>iddleboxes (e.g., Firewalls, IDS/IPS, Antiviruses, Proxies) intercept HTTPS connections</a:t>
+            </a:r>
+          </a:p>
+          <a:p>
+            <a:pPr indent="-228600" lvl="1" marL="914400" rtl="0">
+              <a:lnSpc>
+                <a:spcPct val="115000"/>
+              </a:lnSpc>
+              <a:spcBef>
+                <a:spcPts val="0"/>
+              </a:spcBef>
+            </a:pPr>
+            <a:r>
+              <a:rPr lang="en"/>
+              <a:t>Passively (e.g., Network-level Firewalls and IDS/IPS)</a:t>
+            </a:r>
+          </a:p>
+          <a:p>
+            <a:pPr indent="-228600" lvl="1" marL="914400" rtl="0">
+              <a:lnSpc>
+                <a:spcPct val="115000"/>
+              </a:lnSpc>
+              <a:spcBef>
+                <a:spcPts val="0"/>
+              </a:spcBef>
+            </a:pPr>
+            <a:r>
+              <a:rPr lang="en"/>
+              <a:t>Actively (e.g., Proxies, WAF)</a:t>
             </a:r>
           </a:p>
         </p:txBody>
@@ -5302,8 +5359,8 @@
         </p:blipFill>
         <p:spPr>
           <a:xfrm>
-            <a:off x="1406775" y="2058049"/>
-            <a:ext cx="6430950" cy="2657800"/>
+            <a:off x="2347275" y="2399049"/>
+            <a:ext cx="5605875" cy="2316800"/>
           </a:xfrm>
           <a:prstGeom prst="rect">
             <a:avLst/>
@@ -5410,7 +5467,7 @@
             </a:pPr>
             <a:r>
               <a:rPr lang="en"/>
-              <a:t>HTTPS Interception</a:t>
+              <a:t>HTTPS Interception (Active)</a:t>
             </a:r>
           </a:p>
         </p:txBody>
@@ -5578,7 +5635,7 @@
             </a:pPr>
             <a:r>
               <a:rPr lang="en"/>
-              <a:t>HTTPS Interception</a:t>
+              <a:t>HTTPS Interception (Active)</a:t>
             </a:r>
           </a:p>
         </p:txBody>
@@ -5798,7 +5855,7 @@
             </a:pPr>
             <a:r>
               <a:rPr lang="en"/>
-              <a:t>Change the TLS preferences accordingly</a:t>
+              <a:t>Modify preferences to enable TLS 1.3 in Firefox</a:t>
             </a:r>
           </a:p>
           <a:p>
@@ -6249,13 +6306,13 @@
             </a:pPr>
             <a:r>
               <a:rPr lang="en"/>
-              <a:t>Gathering more reliable data</a:t>
+              <a:t>Gathering more reliable data by running experiment multiple times</a:t>
             </a:r>
           </a:p>
           <a:p>
             <a:pPr indent="-342900" lvl="1" marL="914400" marR="0" rtl="0" algn="l">
               <a:lnSpc>
-                <a:spcPct val="200000"/>
+                <a:spcPct val="115000"/>
               </a:lnSpc>
               <a:spcBef>
                 <a:spcPts val="0"/>
@@ -6272,6 +6329,23 @@
             <a:r>
               <a:rPr lang="en"/>
               <a:t>Minimizing the experiment’s side-effects on the users</a:t>
+            </a:r>
+          </a:p>
+          <a:p>
+            <a:pPr indent="-228600" lvl="2" marL="1371600" marR="0" rtl="0" algn="l">
+              <a:lnSpc>
+                <a:spcPct val="115000"/>
+              </a:lnSpc>
+              <a:spcBef>
+                <a:spcPts val="0"/>
+              </a:spcBef>
+              <a:spcAft>
+                <a:spcPts val="1600"/>
+              </a:spcAft>
+            </a:pPr>
+            <a:r>
+              <a:rPr lang="en"/>
+              <a:t>In case of crash, it leaves the browser with the modified preferences that could affect future user’s browsing experience</a:t>
             </a:r>
           </a:p>
           <a:p>
@@ -6336,6 +6410,285 @@
 </file>
 
 <file path=ppt/theme/theme1.xml><?xml version="1.0" encoding="utf-8"?>
+<a:theme xmlns:a="http://schemas.openxmlformats.org/drawingml/2006/main" xmlns:r="http://schemas.openxmlformats.org/officeDocument/2006/relationships" name="Custom Theme">
+  <a:themeElements>
+    <a:clrScheme name="Default">
+      <a:dk1>
+        <a:srgbClr val="000000"/>
+      </a:dk1>
+      <a:lt1>
+        <a:srgbClr val="FFFFFF"/>
+      </a:lt1>
+      <a:dk2>
+        <a:srgbClr val="158158"/>
+      </a:dk2>
+      <a:lt2>
+        <a:srgbClr val="F3F3F3"/>
+      </a:lt2>
+      <a:accent1>
+        <a:srgbClr val="058DC7"/>
+      </a:accent1>
+      <a:accent2>
+        <a:srgbClr val="50B432"/>
+      </a:accent2>
+      <a:accent3>
+        <a:srgbClr val="ED561B"/>
+      </a:accent3>
+      <a:accent4>
+        <a:srgbClr val="EDEF00"/>
+      </a:accent4>
+      <a:accent5>
+        <a:srgbClr val="24CBE5"/>
+      </a:accent5>
+      <a:accent6>
+        <a:srgbClr val="64E572"/>
+      </a:accent6>
+      <a:hlink>
+        <a:srgbClr val="2200CC"/>
+      </a:hlink>
+      <a:folHlink>
+        <a:srgbClr val="551A8B"/>
+      </a:folHlink>
+    </a:clrScheme>
+    <a:fontScheme name="Office">
+      <a:majorFont>
+        <a:latin typeface="Arial"/>
+        <a:ea typeface=""/>
+        <a:cs typeface=""/>
+        <a:font script="Jpan" typeface="ＭＳ Ｐゴシック"/>
+        <a:font script="Hang" typeface="맑은 고딕"/>
+        <a:font script="Hans" typeface="宋体"/>
+        <a:font script="Hant" typeface="新細明體"/>
+        <a:font script="Arab" typeface="Times New Roman"/>
+        <a:font script="Hebr" typeface="Times New Roman"/>
+        <a:font script="Thai" typeface="Angsana New"/>
+        <a:font script="Ethi" typeface="Nyala"/>
+        <a:font script="Beng" typeface="Vrinda"/>
+        <a:font script="Gujr" typeface="Shruti"/>
+        <a:font script="Khmr" typeface="MoolBoran"/>
+        <a:font script="Knda" typeface="Tunga"/>
+        <a:font script="Guru" typeface="Raavi"/>
+        <a:font script="Cans" typeface="Euphemia"/>
+        <a:font script="Cher" typeface="Plantagenet Cherokee"/>
+        <a:font script="Yiii" typeface="Microsoft Yi Baiti"/>
+        <a:font script="Tibt" typeface="Microsoft Himalaya"/>
+        <a:font script="Thaa" typeface="MV Boli"/>
+        <a:font script="Deva" typeface="Mangal"/>
+        <a:font script="Telu" typeface="Gautami"/>
+        <a:font script="Taml" typeface="Latha"/>
+        <a:font script="Syrc" typeface="Estrangelo Edessa"/>
+        <a:font script="Orya" typeface="Kalinga"/>
+        <a:font script="Mlym" typeface="Kartika"/>
+        <a:font script="Laoo" typeface="DokChampa"/>
+        <a:font script="Sinh" typeface="Iskoola Pota"/>
+        <a:font script="Mong" typeface="Mongolian Baiti"/>
+        <a:font script="Viet" typeface="Times New Roman"/>
+        <a:font script="Uigh" typeface="Microsoft Uighur"/>
+        <a:font script="Geor" typeface="Sylfaen"/>
+      </a:majorFont>
+      <a:minorFont>
+        <a:latin typeface="Arial"/>
+        <a:ea typeface=""/>
+        <a:cs typeface=""/>
+        <a:font script="Jpan" typeface="ＭＳ Ｐゴシック"/>
+        <a:font script="Hang" typeface="맑은 고딕"/>
+        <a:font script="Hans" typeface="宋体"/>
+        <a:font script="Hant" typeface="新細明體"/>
+        <a:font script="Arab" typeface="Arial"/>
+        <a:font script="Hebr" typeface="Arial"/>
+        <a:font script="Thai" typeface="Cordia New"/>
+        <a:font script="Ethi" typeface="Nyala"/>
+        <a:font script="Beng" typeface="Vrinda"/>
+        <a:font script="Gujr" typeface="Shruti"/>
+        <a:font script="Khmr" typeface="DaunPenh"/>
+        <a:font script="Knda" typeface="Tunga"/>
+        <a:font script="Guru" typeface="Raavi"/>
+        <a:font script="Cans" typeface="Euphemia"/>
+        <a:font script="Cher" typeface="Plantagenet Cherokee"/>
+        <a:font script="Yiii" typeface="Microsoft Yi Baiti"/>
+        <a:font script="Tibt" typeface="Microsoft Himalaya"/>
+        <a:font script="Thaa" typeface="MV Boli"/>
+        <a:font script="Deva" typeface="Mangal"/>
+        <a:font script="Telu" typeface="Gautami"/>
+        <a:font script="Taml" typeface="Latha"/>
+        <a:font script="Syrc" typeface="Estrangelo Edessa"/>
+        <a:font script="Orya" typeface="Kalinga"/>
+        <a:font script="Mlym" typeface="Kartika"/>
+        <a:font script="Laoo" typeface="DokChampa"/>
+        <a:font script="Sinh" typeface="Iskoola Pota"/>
+        <a:font script="Mong" typeface="Mongolian Baiti"/>
+        <a:font script="Viet" typeface="Arial"/>
+        <a:font script="Uigh" typeface="Microsoft Uighur"/>
+        <a:font script="Geor" typeface="Sylfaen"/>
+      </a:minorFont>
+    </a:fontScheme>
+    <a:fmtScheme name="Office">
+      <a:fillStyleLst>
+        <a:solidFill>
+          <a:schemeClr val="phClr"/>
+        </a:solidFill>
+        <a:gradFill rotWithShape="1">
+          <a:gsLst>
+            <a:gs pos="0">
+              <a:schemeClr val="phClr">
+                <a:tint val="50000"/>
+                <a:satMod val="300000"/>
+              </a:schemeClr>
+            </a:gs>
+            <a:gs pos="35000">
+              <a:schemeClr val="phClr">
+                <a:tint val="37000"/>
+                <a:satMod val="300000"/>
+              </a:schemeClr>
+            </a:gs>
+            <a:gs pos="100000">
+              <a:schemeClr val="phClr">
+                <a:tint val="15000"/>
+                <a:satMod val="350000"/>
+              </a:schemeClr>
+            </a:gs>
+          </a:gsLst>
+          <a:lin ang="16200000" scaled="1"/>
+        </a:gradFill>
+        <a:gradFill rotWithShape="1">
+          <a:gsLst>
+            <a:gs pos="0">
+              <a:schemeClr val="phClr">
+                <a:tint val="100000"/>
+                <a:shade val="100000"/>
+                <a:satMod val="130000"/>
+              </a:schemeClr>
+            </a:gs>
+            <a:gs pos="100000">
+              <a:schemeClr val="phClr">
+                <a:tint val="50000"/>
+                <a:shade val="100000"/>
+                <a:satMod val="350000"/>
+              </a:schemeClr>
+            </a:gs>
+          </a:gsLst>
+          <a:lin ang="16200000" scaled="0"/>
+        </a:gradFill>
+      </a:fillStyleLst>
+      <a:lnStyleLst>
+        <a:ln w="9525" cap="flat" cmpd="sng" algn="ctr">
+          <a:solidFill>
+            <a:schemeClr val="phClr">
+              <a:shade val="95000"/>
+              <a:satMod val="105000"/>
+            </a:schemeClr>
+          </a:solidFill>
+          <a:prstDash val="solid"/>
+        </a:ln>
+        <a:ln w="25400" cap="flat" cmpd="sng" algn="ctr">
+          <a:solidFill>
+            <a:schemeClr val="phClr"/>
+          </a:solidFill>
+          <a:prstDash val="solid"/>
+        </a:ln>
+        <a:ln w="38100" cap="flat" cmpd="sng" algn="ctr">
+          <a:solidFill>
+            <a:schemeClr val="phClr"/>
+          </a:solidFill>
+          <a:prstDash val="solid"/>
+        </a:ln>
+      </a:lnStyleLst>
+      <a:effectStyleLst>
+        <a:effectStyle>
+          <a:effectLst>
+            <a:outerShdw blurRad="40000" dist="20000" dir="5400000" rotWithShape="0">
+              <a:srgbClr val="000000">
+                <a:alpha val="38000"/>
+              </a:srgbClr>
+            </a:outerShdw>
+          </a:effectLst>
+        </a:effectStyle>
+        <a:effectStyle>
+          <a:effectLst>
+            <a:outerShdw blurRad="40000" dist="23000" dir="5400000" rotWithShape="0">
+              <a:srgbClr val="000000">
+                <a:alpha val="35000"/>
+              </a:srgbClr>
+            </a:outerShdw>
+          </a:effectLst>
+        </a:effectStyle>
+        <a:effectStyle>
+          <a:effectLst>
+            <a:outerShdw blurRad="40000" dist="23000" dir="5400000" rotWithShape="0">
+              <a:srgbClr val="000000">
+                <a:alpha val="35000"/>
+              </a:srgbClr>
+            </a:outerShdw>
+          </a:effectLst>
+          <a:scene3d>
+            <a:camera prst="orthographicFront">
+              <a:rot lat="0" lon="0" rev="0"/>
+            </a:camera>
+            <a:lightRig rig="threePt" dir="t">
+              <a:rot lat="0" lon="0" rev="1200000"/>
+            </a:lightRig>
+          </a:scene3d>
+          <a:sp3d>
+            <a:bevelT w="63500" h="25400"/>
+          </a:sp3d>
+        </a:effectStyle>
+      </a:effectStyleLst>
+      <a:bgFillStyleLst>
+        <a:solidFill>
+          <a:schemeClr val="phClr"/>
+        </a:solidFill>
+        <a:gradFill rotWithShape="1">
+          <a:gsLst>
+            <a:gs pos="0">
+              <a:schemeClr val="phClr">
+                <a:tint val="40000"/>
+                <a:satMod val="350000"/>
+              </a:schemeClr>
+            </a:gs>
+            <a:gs pos="40000">
+              <a:schemeClr val="phClr">
+                <a:tint val="45000"/>
+                <a:shade val="99000"/>
+                <a:satMod val="350000"/>
+              </a:schemeClr>
+            </a:gs>
+            <a:gs pos="100000">
+              <a:schemeClr val="phClr">
+                <a:shade val="20000"/>
+                <a:satMod val="255000"/>
+              </a:schemeClr>
+            </a:gs>
+          </a:gsLst>
+          <a:path path="circle">
+            <a:fillToRect l="50000" t="-80000" r="50000" b="180000"/>
+          </a:path>
+        </a:gradFill>
+        <a:gradFill rotWithShape="1">
+          <a:gsLst>
+            <a:gs pos="0">
+              <a:schemeClr val="phClr">
+                <a:tint val="80000"/>
+                <a:satMod val="300000"/>
+              </a:schemeClr>
+            </a:gs>
+            <a:gs pos="100000">
+              <a:schemeClr val="phClr">
+                <a:shade val="30000"/>
+                <a:satMod val="200000"/>
+              </a:schemeClr>
+            </a:gs>
+          </a:gsLst>
+          <a:path path="circle">
+            <a:fillToRect l="50000" t="50000" r="50000" b="50000"/>
+          </a:path>
+        </a:gradFill>
+      </a:bgFillStyleLst>
+    </a:fmtScheme>
+  </a:themeElements>
+</a:theme>
+</file>
+
+<file path=ppt/theme/theme2.xml><?xml version="1.0" encoding="utf-8"?>
 <a:theme xmlns:a="http://schemas.openxmlformats.org/drawingml/2006/main" xmlns:r="http://schemas.openxmlformats.org/officeDocument/2006/relationships" name="simple-light-2">
   <a:themeElements>
     <a:clrScheme name="Simple Light">
@@ -6612,283 +6965,4 @@
     </a:fmtScheme>
   </a:themeElements>
 </a:theme>
-</file>
-
-<file path=ppt/theme/theme2.xml><?xml version="1.0" encoding="utf-8"?>
-<a:theme xmlns:a="http://schemas.openxmlformats.org/drawingml/2006/main" xmlns:r="http://schemas.openxmlformats.org/officeDocument/2006/relationships" name="Custom Theme">
-  <a:themeElements>
-    <a:clrScheme name="Default">
-      <a:dk1>
-        <a:srgbClr val="000000"/>
-      </a:dk1>
-      <a:lt1>
-        <a:srgbClr val="FFFFFF"/>
-      </a:lt1>
-      <a:dk2>
-        <a:srgbClr val="158158"/>
-      </a:dk2>
-      <a:lt2>
-        <a:srgbClr val="F3F3F3"/>
-      </a:lt2>
-      <a:accent1>
-        <a:srgbClr val="058DC7"/>
-      </a:accent1>
-      <a:accent2>
-        <a:srgbClr val="50B432"/>
-      </a:accent2>
-      <a:accent3>
-        <a:srgbClr val="ED561B"/>
-      </a:accent3>
-      <a:accent4>
-        <a:srgbClr val="EDEF00"/>
-      </a:accent4>
-      <a:accent5>
-        <a:srgbClr val="24CBE5"/>
-      </a:accent5>
-      <a:accent6>
-        <a:srgbClr val="64E572"/>
-      </a:accent6>
-      <a:hlink>
-        <a:srgbClr val="2200CC"/>
-      </a:hlink>
-      <a:folHlink>
-        <a:srgbClr val="551A8B"/>
-      </a:folHlink>
-    </a:clrScheme>
-    <a:fontScheme name="Office">
-      <a:majorFont>
-        <a:latin typeface="Arial"/>
-        <a:ea typeface=""/>
-        <a:cs typeface=""/>
-        <a:font script="Jpan" typeface="ＭＳ Ｐゴシック"/>
-        <a:font script="Hang" typeface="맑은 고딕"/>
-        <a:font script="Hans" typeface="宋体"/>
-        <a:font script="Hant" typeface="新細明體"/>
-        <a:font script="Arab" typeface="Times New Roman"/>
-        <a:font script="Hebr" typeface="Times New Roman"/>
-        <a:font script="Thai" typeface="Angsana New"/>
-        <a:font script="Ethi" typeface="Nyala"/>
-        <a:font script="Beng" typeface="Vrinda"/>
-        <a:font script="Gujr" typeface="Shruti"/>
-        <a:font script="Khmr" typeface="MoolBoran"/>
-        <a:font script="Knda" typeface="Tunga"/>
-        <a:font script="Guru" typeface="Raavi"/>
-        <a:font script="Cans" typeface="Euphemia"/>
-        <a:font script="Cher" typeface="Plantagenet Cherokee"/>
-        <a:font script="Yiii" typeface="Microsoft Yi Baiti"/>
-        <a:font script="Tibt" typeface="Microsoft Himalaya"/>
-        <a:font script="Thaa" typeface="MV Boli"/>
-        <a:font script="Deva" typeface="Mangal"/>
-        <a:font script="Telu" typeface="Gautami"/>
-        <a:font script="Taml" typeface="Latha"/>
-        <a:font script="Syrc" typeface="Estrangelo Edessa"/>
-        <a:font script="Orya" typeface="Kalinga"/>
-        <a:font script="Mlym" typeface="Kartika"/>
-        <a:font script="Laoo" typeface="DokChampa"/>
-        <a:font script="Sinh" typeface="Iskoola Pota"/>
-        <a:font script="Mong" typeface="Mongolian Baiti"/>
-        <a:font script="Viet" typeface="Times New Roman"/>
-        <a:font script="Uigh" typeface="Microsoft Uighur"/>
-        <a:font script="Geor" typeface="Sylfaen"/>
-      </a:majorFont>
-      <a:minorFont>
-        <a:latin typeface="Arial"/>
-        <a:ea typeface=""/>
-        <a:cs typeface=""/>
-        <a:font script="Jpan" typeface="ＭＳ Ｐゴシック"/>
-        <a:font script="Hang" typeface="맑은 고딕"/>
-        <a:font script="Hans" typeface="宋体"/>
-        <a:font script="Hant" typeface="新細明體"/>
-        <a:font script="Arab" typeface="Arial"/>
-        <a:font script="Hebr" typeface="Arial"/>
-        <a:font script="Thai" typeface="Cordia New"/>
-        <a:font script="Ethi" typeface="Nyala"/>
-        <a:font script="Beng" typeface="Vrinda"/>
-        <a:font script="Gujr" typeface="Shruti"/>
-        <a:font script="Khmr" typeface="DaunPenh"/>
-        <a:font script="Knda" typeface="Tunga"/>
-        <a:font script="Guru" typeface="Raavi"/>
-        <a:font script="Cans" typeface="Euphemia"/>
-        <a:font script="Cher" typeface="Plantagenet Cherokee"/>
-        <a:font script="Yiii" typeface="Microsoft Yi Baiti"/>
-        <a:font script="Tibt" typeface="Microsoft Himalaya"/>
-        <a:font script="Thaa" typeface="MV Boli"/>
-        <a:font script="Deva" typeface="Mangal"/>
-        <a:font script="Telu" typeface="Gautami"/>
-        <a:font script="Taml" typeface="Latha"/>
-        <a:font script="Syrc" typeface="Estrangelo Edessa"/>
-        <a:font script="Orya" typeface="Kalinga"/>
-        <a:font script="Mlym" typeface="Kartika"/>
-        <a:font script="Laoo" typeface="DokChampa"/>
-        <a:font script="Sinh" typeface="Iskoola Pota"/>
-        <a:font script="Mong" typeface="Mongolian Baiti"/>
-        <a:font script="Viet" typeface="Arial"/>
-        <a:font script="Uigh" typeface="Microsoft Uighur"/>
-        <a:font script="Geor" typeface="Sylfaen"/>
-      </a:minorFont>
-    </a:fontScheme>
-    <a:fmtScheme name="Office">
-      <a:fillStyleLst>
-        <a:solidFill>
-          <a:schemeClr val="phClr"/>
-        </a:solidFill>
-        <a:gradFill rotWithShape="1">
-          <a:gsLst>
-            <a:gs pos="0">
-              <a:schemeClr val="phClr">
-                <a:tint val="50000"/>
-                <a:satMod val="300000"/>
-              </a:schemeClr>
-            </a:gs>
-            <a:gs pos="35000">
-              <a:schemeClr val="phClr">
-                <a:tint val="37000"/>
-                <a:satMod val="300000"/>
-              </a:schemeClr>
-            </a:gs>
-            <a:gs pos="100000">
-              <a:schemeClr val="phClr">
-                <a:tint val="15000"/>
-                <a:satMod val="350000"/>
-              </a:schemeClr>
-            </a:gs>
-          </a:gsLst>
-          <a:lin ang="16200000" scaled="1"/>
-        </a:gradFill>
-        <a:gradFill rotWithShape="1">
-          <a:gsLst>
-            <a:gs pos="0">
-              <a:schemeClr val="phClr">
-                <a:tint val="100000"/>
-                <a:shade val="100000"/>
-                <a:satMod val="130000"/>
-              </a:schemeClr>
-            </a:gs>
-            <a:gs pos="100000">
-              <a:schemeClr val="phClr">
-                <a:tint val="50000"/>
-                <a:shade val="100000"/>
-                <a:satMod val="350000"/>
-              </a:schemeClr>
-            </a:gs>
-          </a:gsLst>
-          <a:lin ang="16200000" scaled="0"/>
-        </a:gradFill>
-      </a:fillStyleLst>
-      <a:lnStyleLst>
-        <a:ln w="9525" cap="flat" cmpd="sng" algn="ctr">
-          <a:solidFill>
-            <a:schemeClr val="phClr">
-              <a:shade val="95000"/>
-              <a:satMod val="105000"/>
-            </a:schemeClr>
-          </a:solidFill>
-          <a:prstDash val="solid"/>
-        </a:ln>
-        <a:ln w="25400" cap="flat" cmpd="sng" algn="ctr">
-          <a:solidFill>
-            <a:schemeClr val="phClr"/>
-          </a:solidFill>
-          <a:prstDash val="solid"/>
-        </a:ln>
-        <a:ln w="38100" cap="flat" cmpd="sng" algn="ctr">
-          <a:solidFill>
-            <a:schemeClr val="phClr"/>
-          </a:solidFill>
-          <a:prstDash val="solid"/>
-        </a:ln>
-      </a:lnStyleLst>
-      <a:effectStyleLst>
-        <a:effectStyle>
-          <a:effectLst>
-            <a:outerShdw blurRad="40000" dist="20000" dir="5400000" rotWithShape="0">
-              <a:srgbClr val="000000">
-                <a:alpha val="38000"/>
-              </a:srgbClr>
-            </a:outerShdw>
-          </a:effectLst>
-        </a:effectStyle>
-        <a:effectStyle>
-          <a:effectLst>
-            <a:outerShdw blurRad="40000" dist="23000" dir="5400000" rotWithShape="0">
-              <a:srgbClr val="000000">
-                <a:alpha val="35000"/>
-              </a:srgbClr>
-            </a:outerShdw>
-          </a:effectLst>
-        </a:effectStyle>
-        <a:effectStyle>
-          <a:effectLst>
-            <a:outerShdw blurRad="40000" dist="23000" dir="5400000" rotWithShape="0">
-              <a:srgbClr val="000000">
-                <a:alpha val="35000"/>
-              </a:srgbClr>
-            </a:outerShdw>
-          </a:effectLst>
-          <a:scene3d>
-            <a:camera prst="orthographicFront">
-              <a:rot lat="0" lon="0" rev="0"/>
-            </a:camera>
-            <a:lightRig rig="threePt" dir="t">
-              <a:rot lat="0" lon="0" rev="1200000"/>
-            </a:lightRig>
-          </a:scene3d>
-          <a:sp3d>
-            <a:bevelT w="63500" h="25400"/>
-          </a:sp3d>
-        </a:effectStyle>
-      </a:effectStyleLst>
-      <a:bgFillStyleLst>
-        <a:solidFill>
-          <a:schemeClr val="phClr"/>
-        </a:solidFill>
-        <a:gradFill rotWithShape="1">
-          <a:gsLst>
-            <a:gs pos="0">
-              <a:schemeClr val="phClr">
-                <a:tint val="40000"/>
-                <a:satMod val="350000"/>
-              </a:schemeClr>
-            </a:gs>
-            <a:gs pos="40000">
-              <a:schemeClr val="phClr">
-                <a:tint val="45000"/>
-                <a:shade val="99000"/>
-                <a:satMod val="350000"/>
-              </a:schemeClr>
-            </a:gs>
-            <a:gs pos="100000">
-              <a:schemeClr val="phClr">
-                <a:shade val="20000"/>
-                <a:satMod val="255000"/>
-              </a:schemeClr>
-            </a:gs>
-          </a:gsLst>
-          <a:path path="circle">
-            <a:fillToRect l="50000" t="-80000" r="50000" b="180000"/>
-          </a:path>
-        </a:gradFill>
-        <a:gradFill rotWithShape="1">
-          <a:gsLst>
-            <a:gs pos="0">
-              <a:schemeClr val="phClr">
-                <a:tint val="80000"/>
-                <a:satMod val="300000"/>
-              </a:schemeClr>
-            </a:gs>
-            <a:gs pos="100000">
-              <a:schemeClr val="phClr">
-                <a:shade val="30000"/>
-                <a:satMod val="200000"/>
-              </a:schemeClr>
-            </a:gs>
-          </a:gsLst>
-          <a:path path="circle">
-            <a:fillToRect l="50000" t="50000" r="50000" b="50000"/>
-          </a:path>
-        </a:gradFill>
-      </a:bgFillStyleLst>
-    </a:fmtScheme>
-  </a:themeElements>
-</a:theme>
 </file>
</xml_diff>